<commit_message>
update SF Python presentation
</commit_message>
<xml_diff>
--- a/doc/awsimple_sf_python_6_21.pptx
+++ b/doc/awsimple_sf_python_6_21.pptx
@@ -211,7 +211,7 @@
           <a:p>
             <a:fld id="{E3F3C203-C60F-4F58-A893-D058A36AB2D9}" type="datetimeFigureOut">
               <a:rPr lang="en-US" smtClean="0"/>
-              <a:t>6/15/2021</a:t>
+              <a:t>6/16/2021</a:t>
             </a:fld>
             <a:endParaRPr lang="en-US"/>
           </a:p>
@@ -524,6 +524,93 @@
           <a:p>
             <a:r>
               <a:rPr lang="en-US" dirty="0"/>
+              <a:t>The user doesn’t have to worry about AWS/boto3 “resource” vs. “client”, but can use these if they need to access specific features AWSimple doesn’t provide</a:t>
+            </a:r>
+          </a:p>
+        </p:txBody>
+      </p:sp>
+      <p:sp>
+        <p:nvSpPr>
+          <p:cNvPr id="4" name="Slide Number Placeholder 3"/>
+          <p:cNvSpPr>
+            <a:spLocks noGrp="1"/>
+          </p:cNvSpPr>
+          <p:nvPr>
+            <p:ph type="sldNum" sz="quarter" idx="5"/>
+          </p:nvPr>
+        </p:nvSpPr>
+        <p:spPr/>
+        <p:txBody>
+          <a:bodyPr/>
+          <a:lstStyle/>
+          <a:p>
+            <a:fld id="{E5729457-356E-4D5D-B97F-6B0C1CB229E4}" type="slidenum">
+              <a:rPr lang="en-US" smtClean="0"/>
+              <a:t>2</a:t>
+            </a:fld>
+            <a:endParaRPr lang="en-US"/>
+          </a:p>
+        </p:txBody>
+      </p:sp>
+    </p:spTree>
+    <p:extLst>
+      <p:ext uri="{BB962C8B-B14F-4D97-AF65-F5344CB8AC3E}">
+        <p14:creationId xmlns:p14="http://schemas.microsoft.com/office/powerpoint/2010/main" val="1014102278"/>
+      </p:ext>
+    </p:extLst>
+  </p:cSld>
+  <p:clrMapOvr>
+    <a:masterClrMapping/>
+  </p:clrMapOvr>
+</p:notes>
+</file>
+
+<file path=ppt/notesSlides/notesSlide2.xml><?xml version="1.0" encoding="utf-8"?>
+<p:notes xmlns:a="http://schemas.openxmlformats.org/drawingml/2006/main" xmlns:r="http://schemas.openxmlformats.org/officeDocument/2006/relationships" xmlns:p="http://schemas.openxmlformats.org/presentationml/2006/main">
+  <p:cSld>
+    <p:spTree>
+      <p:nvGrpSpPr>
+        <p:cNvPr id="1" name=""/>
+        <p:cNvGrpSpPr/>
+        <p:nvPr/>
+      </p:nvGrpSpPr>
+      <p:grpSpPr>
+        <a:xfrm>
+          <a:off x="0" y="0"/>
+          <a:ext cx="0" cy="0"/>
+          <a:chOff x="0" y="0"/>
+          <a:chExt cx="0" cy="0"/>
+        </a:xfrm>
+      </p:grpSpPr>
+      <p:sp>
+        <p:nvSpPr>
+          <p:cNvPr id="2" name="Slide Image Placeholder 1"/>
+          <p:cNvSpPr>
+            <a:spLocks noGrp="1" noRot="1" noChangeAspect="1"/>
+          </p:cNvSpPr>
+          <p:nvPr>
+            <p:ph type="sldImg"/>
+          </p:nvPr>
+        </p:nvSpPr>
+        <p:spPr/>
+      </p:sp>
+      <p:sp>
+        <p:nvSpPr>
+          <p:cNvPr id="3" name="Notes Placeholder 2"/>
+          <p:cNvSpPr>
+            <a:spLocks noGrp="1"/>
+          </p:cNvSpPr>
+          <p:nvPr>
+            <p:ph type="body" idx="1"/>
+          </p:nvPr>
+        </p:nvSpPr>
+        <p:spPr/>
+        <p:txBody>
+          <a:bodyPr/>
+          <a:lstStyle/>
+          <a:p>
+            <a:r>
+              <a:rPr lang="en-US" dirty="0"/>
               <a:t>AWS S3 </a:t>
             </a:r>
             <a:r>
@@ -608,7 +695,7 @@
 </p:notes>
 </file>
 
-<file path=ppt/notesSlides/notesSlide2.xml><?xml version="1.0" encoding="utf-8"?>
+<file path=ppt/notesSlides/notesSlide3.xml><?xml version="1.0" encoding="utf-8"?>
 <p:notes xmlns:a="http://schemas.openxmlformats.org/drawingml/2006/main" xmlns:r="http://schemas.openxmlformats.org/officeDocument/2006/relationships" xmlns:p="http://schemas.openxmlformats.org/presentationml/2006/main">
   <p:cSld>
     <p:spTree>
@@ -828,7 +915,7 @@
           <a:p>
             <a:fld id="{A7E42F8A-3D39-453B-97B3-448A71AE72F9}" type="datetimeFigureOut">
               <a:rPr lang="en-US" smtClean="0"/>
-              <a:t>6/15/2021</a:t>
+              <a:t>6/16/2021</a:t>
             </a:fld>
             <a:endParaRPr lang="en-US"/>
           </a:p>
@@ -1001,7 +1088,7 @@
           <a:p>
             <a:fld id="{A7E42F8A-3D39-453B-97B3-448A71AE72F9}" type="datetimeFigureOut">
               <a:rPr lang="en-US" smtClean="0"/>
-              <a:t>6/15/2021</a:t>
+              <a:t>6/16/2021</a:t>
             </a:fld>
             <a:endParaRPr lang="en-US"/>
           </a:p>
@@ -1179,7 +1266,7 @@
           <a:p>
             <a:fld id="{A7E42F8A-3D39-453B-97B3-448A71AE72F9}" type="datetimeFigureOut">
               <a:rPr lang="en-US" smtClean="0"/>
-              <a:t>6/15/2021</a:t>
+              <a:t>6/16/2021</a:t>
             </a:fld>
             <a:endParaRPr lang="en-US"/>
           </a:p>
@@ -1347,7 +1434,7 @@
           <a:p>
             <a:fld id="{A7E42F8A-3D39-453B-97B3-448A71AE72F9}" type="datetimeFigureOut">
               <a:rPr lang="en-US" smtClean="0"/>
-              <a:t>6/15/2021</a:t>
+              <a:t>6/16/2021</a:t>
             </a:fld>
             <a:endParaRPr lang="en-US"/>
           </a:p>
@@ -1597,7 +1684,7 @@
           <a:p>
             <a:fld id="{A7E42F8A-3D39-453B-97B3-448A71AE72F9}" type="datetimeFigureOut">
               <a:rPr lang="en-US" smtClean="0"/>
-              <a:t>6/15/2021</a:t>
+              <a:t>6/16/2021</a:t>
             </a:fld>
             <a:endParaRPr lang="en-US"/>
           </a:p>
@@ -1826,7 +1913,7 @@
           <a:p>
             <a:fld id="{A7E42F8A-3D39-453B-97B3-448A71AE72F9}" type="datetimeFigureOut">
               <a:rPr lang="en-US" smtClean="0"/>
-              <a:t>6/15/2021</a:t>
+              <a:t>6/16/2021</a:t>
             </a:fld>
             <a:endParaRPr lang="en-US"/>
           </a:p>
@@ -2190,7 +2277,7 @@
           <a:p>
             <a:fld id="{A7E42F8A-3D39-453B-97B3-448A71AE72F9}" type="datetimeFigureOut">
               <a:rPr lang="en-US" smtClean="0"/>
-              <a:t>6/15/2021</a:t>
+              <a:t>6/16/2021</a:t>
             </a:fld>
             <a:endParaRPr lang="en-US"/>
           </a:p>
@@ -2307,7 +2394,7 @@
           <a:p>
             <a:fld id="{A7E42F8A-3D39-453B-97B3-448A71AE72F9}" type="datetimeFigureOut">
               <a:rPr lang="en-US" smtClean="0"/>
-              <a:t>6/15/2021</a:t>
+              <a:t>6/16/2021</a:t>
             </a:fld>
             <a:endParaRPr lang="en-US"/>
           </a:p>
@@ -2402,7 +2489,7 @@
           <a:p>
             <a:fld id="{A7E42F8A-3D39-453B-97B3-448A71AE72F9}" type="datetimeFigureOut">
               <a:rPr lang="en-US" smtClean="0"/>
-              <a:t>6/15/2021</a:t>
+              <a:t>6/16/2021</a:t>
             </a:fld>
             <a:endParaRPr lang="en-US"/>
           </a:p>
@@ -2677,7 +2764,7 @@
           <a:p>
             <a:fld id="{A7E42F8A-3D39-453B-97B3-448A71AE72F9}" type="datetimeFigureOut">
               <a:rPr lang="en-US" smtClean="0"/>
-              <a:t>6/15/2021</a:t>
+              <a:t>6/16/2021</a:t>
             </a:fld>
             <a:endParaRPr lang="en-US"/>
           </a:p>
@@ -2929,7 +3016,7 @@
           <a:p>
             <a:fld id="{A7E42F8A-3D39-453B-97B3-448A71AE72F9}" type="datetimeFigureOut">
               <a:rPr lang="en-US" smtClean="0"/>
-              <a:t>6/15/2021</a:t>
+              <a:t>6/16/2021</a:t>
             </a:fld>
             <a:endParaRPr lang="en-US"/>
           </a:p>
@@ -3140,7 +3227,7 @@
           <a:p>
             <a:fld id="{A7E42F8A-3D39-453B-97B3-448A71AE72F9}" type="datetimeFigureOut">
               <a:rPr lang="en-US" smtClean="0"/>
-              <a:t>6/15/2021</a:t>
+              <a:t>6/16/2021</a:t>
             </a:fld>
             <a:endParaRPr lang="en-US"/>
           </a:p>
@@ -5850,8 +5937,8 @@
         </p:nvSpPr>
         <p:spPr>
           <a:xfrm>
-            <a:off x="206813" y="159299"/>
-            <a:ext cx="10515600" cy="1325563"/>
+            <a:off x="358273" y="159299"/>
+            <a:ext cx="10364139" cy="872743"/>
           </a:xfrm>
         </p:spPr>
         <p:txBody>
@@ -5883,8 +5970,8 @@
         </p:nvSpPr>
         <p:spPr>
           <a:xfrm>
-            <a:off x="684888" y="1309255"/>
-            <a:ext cx="10515600" cy="4841104"/>
+            <a:off x="684888" y="1309254"/>
+            <a:ext cx="10515600" cy="5086199"/>
           </a:xfrm>
         </p:spPr>
         <p:txBody>
@@ -5974,6 +6061,13 @@
             <a:pPr lvl="1"/>
             <a:r>
               <a:rPr lang="en-US" dirty="0"/>
+              <a:t>AWS managed</a:t>
+            </a:r>
+          </a:p>
+          <a:p>
+            <a:pPr lvl="1"/>
+            <a:r>
+              <a:rPr lang="en-US" dirty="0"/>
               <a:t>On-demand, automatically scales</a:t>
             </a:r>
           </a:p>
@@ -6011,11 +6105,17 @@
                 <a:latin typeface="Courier New" panose="02070309020205020404" pitchFamily="49" charset="0"/>
                 <a:cs typeface="Courier New" panose="02070309020205020404" pitchFamily="49" charset="0"/>
               </a:rPr>
-              <a:t>test()</a:t>
+              <a:t>.test()</a:t>
             </a:r>
             <a:r>
               <a:rPr lang="en-US" dirty="0"/>
               <a:t>methods for access (IAM) debug</a:t>
+            </a:r>
+          </a:p>
+          <a:p>
+            <a:r>
+              <a:rPr lang="en-US" dirty="0"/>
+              <a:t>Uses and works with AWS’s boto3. Can still utilize boto3 for things AWSimple doesn’t provide.</a:t>
             </a:r>
           </a:p>
           <a:p>
@@ -6897,7 +6997,7 @@
                 <a:latin typeface="Courier New" panose="02070309020205020404" pitchFamily="49" charset="0"/>
                 <a:cs typeface="Courier New" panose="02070309020205020404" pitchFamily="49" charset="0"/>
               </a:rPr>
-              <a:t>() - list out all buckets</a:t>
+              <a:t>() - list out all buckets in an account</a:t>
             </a:r>
           </a:p>
           <a:p>

</xml_diff>